<commit_message>
feat: PostgreSQL session 02 después del taller
</commit_message>
<xml_diff>
--- a/PostgreSQL/22-1/Session 02/0. Session_02.pptx
+++ b/PostgreSQL/22-1/Session 02/0. Session_02.pptx
@@ -228,7 +228,7 @@
           <a:p>
             <a:fld id="{EA8681ED-A9C7-4095-8315-26FE0ED3D984}" type="datetimeFigureOut">
               <a:rPr lang="es-PE" smtClean="0"/>
-              <a:t>24/08/2022</a:t>
+              <a:t>25/08/2022</a:t>
             </a:fld>
             <a:endParaRPr lang="es-PE"/>
           </a:p>
@@ -405,7 +405,7 @@
           <a:p>
             <a:fld id="{B565B788-35F0-4EB2-9B5F-85F9CCE159E8}" type="datetimeFigureOut">
               <a:rPr lang="es-PE" smtClean="0"/>
-              <a:t>24/08/2022</a:t>
+              <a:t>25/08/2022</a:t>
             </a:fld>
             <a:endParaRPr lang="es-PE"/>
           </a:p>
@@ -830,7 +830,7 @@
           <a:p>
             <a:fld id="{040F29B9-EC76-4775-BB4A-774803E04420}" type="datetime1">
               <a:rPr lang="es-PE" smtClean="0"/>
-              <a:t>24/08/2022</a:t>
+              <a:t>25/08/2022</a:t>
             </a:fld>
             <a:endParaRPr lang="es-PE"/>
           </a:p>
@@ -1038,7 +1038,7 @@
           <a:p>
             <a:fld id="{40E753E3-6CD2-4360-BB55-EF26BD024005}" type="datetime1">
               <a:rPr lang="es-PE" smtClean="0"/>
-              <a:t>24/08/2022</a:t>
+              <a:t>25/08/2022</a:t>
             </a:fld>
             <a:endParaRPr lang="es-PE"/>
           </a:p>
@@ -1256,7 +1256,7 @@
           <a:p>
             <a:fld id="{60752946-6263-41C9-8D70-0E880AEBC576}" type="datetime1">
               <a:rPr lang="es-PE" smtClean="0"/>
-              <a:t>24/08/2022</a:t>
+              <a:t>25/08/2022</a:t>
             </a:fld>
             <a:endParaRPr lang="es-PE"/>
           </a:p>
@@ -1464,7 +1464,7 @@
           <a:p>
             <a:fld id="{4C6184D5-70D2-43B6-8F7F-928D5DD9981A}" type="datetime1">
               <a:rPr lang="es-PE" smtClean="0"/>
-              <a:t>24/08/2022</a:t>
+              <a:t>25/08/2022</a:t>
             </a:fld>
             <a:endParaRPr lang="es-PE"/>
           </a:p>
@@ -1748,7 +1748,7 @@
           <a:p>
             <a:fld id="{D497B964-A55D-4EEA-99DB-C049F204C87D}" type="datetime1">
               <a:rPr lang="es-PE" smtClean="0"/>
-              <a:t>24/08/2022</a:t>
+              <a:t>25/08/2022</a:t>
             </a:fld>
             <a:endParaRPr lang="es-PE"/>
           </a:p>
@@ -2024,7 +2024,7 @@
           <a:p>
             <a:fld id="{779AF23E-B2F5-47EC-89EB-E68E6856BA43}" type="datetime1">
               <a:rPr lang="es-PE" smtClean="0"/>
-              <a:t>24/08/2022</a:t>
+              <a:t>25/08/2022</a:t>
             </a:fld>
             <a:endParaRPr lang="es-PE"/>
           </a:p>
@@ -2447,7 +2447,7 @@
           <a:p>
             <a:fld id="{C85F21E0-97EF-4CD5-B51F-A5559BB4EA21}" type="datetime1">
               <a:rPr lang="es-PE" smtClean="0"/>
-              <a:t>24/08/2022</a:t>
+              <a:t>25/08/2022</a:t>
             </a:fld>
             <a:endParaRPr lang="es-PE"/>
           </a:p>
@@ -2597,7 +2597,7 @@
           <a:p>
             <a:fld id="{E274F692-D94E-4F87-981E-9AC8378A0052}" type="datetime1">
               <a:rPr lang="es-PE" smtClean="0"/>
-              <a:t>24/08/2022</a:t>
+              <a:t>25/08/2022</a:t>
             </a:fld>
             <a:endParaRPr lang="es-PE"/>
           </a:p>
@@ -2718,7 +2718,7 @@
           <a:p>
             <a:fld id="{8577A578-5F87-4661-A88B-AC70D4B2152D}" type="datetime1">
               <a:rPr lang="es-PE" smtClean="0"/>
-              <a:t>24/08/2022</a:t>
+              <a:t>25/08/2022</a:t>
             </a:fld>
             <a:endParaRPr lang="es-PE"/>
           </a:p>
@@ -3039,7 +3039,7 @@
           <a:p>
             <a:fld id="{9704D5FB-706E-42B9-B8FA-54B8575D362D}" type="datetime1">
               <a:rPr lang="es-PE" smtClean="0"/>
-              <a:t>24/08/2022</a:t>
+              <a:t>25/08/2022</a:t>
             </a:fld>
             <a:endParaRPr lang="es-PE"/>
           </a:p>
@@ -3340,7 +3340,7 @@
           <a:p>
             <a:fld id="{60449A80-82F0-4F56-BBA2-22C8AB26A557}" type="datetime1">
               <a:rPr lang="es-PE" smtClean="0"/>
-              <a:t>24/08/2022</a:t>
+              <a:t>25/08/2022</a:t>
             </a:fld>
             <a:endParaRPr lang="es-PE"/>
           </a:p>
@@ -6760,8 +6760,8 @@
         </p:nvSpPr>
         <p:spPr>
           <a:xfrm>
-            <a:off x="2677486" y="4061018"/>
-            <a:ext cx="6837027" cy="369332"/>
+            <a:off x="2567729" y="4139223"/>
+            <a:ext cx="7056539" cy="369332"/>
           </a:xfrm>
           <a:prstGeom prst="rect">
             <a:avLst/>
@@ -6834,7 +6834,37 @@
                 <a:effectLst/>
                 <a:latin typeface="Courier New" panose="02070309020205020404" pitchFamily="49" charset="0"/>
               </a:rPr>
-              <a:t>;</a:t>
+              <a:t> [</a:t>
+            </a:r>
+            <a:r>
+              <a:rPr lang="en-US" b="0" i="0" dirty="0">
+                <a:solidFill>
+                  <a:srgbClr val="FCBA7D"/>
+                </a:solidFill>
+                <a:effectLst/>
+                <a:latin typeface="Courier New" panose="02070309020205020404" pitchFamily="49" charset="0"/>
+              </a:rPr>
+              <a:t>CASCADE</a:t>
+            </a:r>
+            <a:r>
+              <a:rPr lang="en-US" b="0" i="0" dirty="0">
+                <a:solidFill>
+                  <a:srgbClr val="E8E6E3"/>
+                </a:solidFill>
+                <a:effectLst/>
+                <a:latin typeface="Courier New" panose="02070309020205020404" pitchFamily="49" charset="0"/>
+              </a:rPr>
+              <a:t> | RESTRICT</a:t>
+            </a:r>
+            <a:r>
+              <a:rPr lang="es-PE" b="0" i="0" dirty="0">
+                <a:solidFill>
+                  <a:srgbClr val="E8E6E3"/>
+                </a:solidFill>
+                <a:effectLst/>
+                <a:latin typeface="Courier New" panose="02070309020205020404" pitchFamily="49" charset="0"/>
+              </a:rPr>
+              <a:t>];</a:t>
             </a:r>
             <a:endParaRPr lang="en-US" b="0" dirty="0">
               <a:solidFill>
@@ -8925,7 +8955,7 @@
             </a:r>
             <a:r>
               <a:rPr lang="es-PE" dirty="0" err="1"/>
-              <a:t>s,p</a:t>
+              <a:t>p,s</a:t>
             </a:r>
             <a:r>
               <a:rPr lang="es-PE" dirty="0"/>

</xml_diff>